<commit_message>
included several files from another project.
</commit_message>
<xml_diff>
--- a/Docs/Figures.pptx
+++ b/Docs/Figures.pptx
@@ -7,6 +7,7 @@
   <p:sldIdLst>
     <p:sldId id="257" r:id="rId2"/>
     <p:sldId id="258" r:id="rId3"/>
+    <p:sldId id="259" r:id="rId4"/>
   </p:sldIdLst>
   <p:sldSz cx="12192000" cy="6858000"/>
   <p:notesSz cx="6858000" cy="9144000"/>
@@ -105,6 +106,11 @@
       </a:defRPr>
     </a:lvl9pPr>
   </p:defaultTextStyle>
+  <p:extLst>
+    <p:ext uri="{EFAFB233-063F-42B5-8137-9DF3F51BA10A}">
+      <p15:sldGuideLst xmlns:p15="http://schemas.microsoft.com/office/powerpoint/2012/main"/>
+    </p:ext>
+  </p:extLst>
 </p:presentation>
 </file>
 
@@ -259,7 +265,7 @@
           <a:p>
             <a:fld id="{0ACCDA5F-2533-49E2-AC69-2001D303C7D1}" type="datetimeFigureOut">
               <a:rPr lang="en-US" smtClean="0"/>
-              <a:t>11/24/2017</a:t>
+              <a:t>12/9/2017</a:t>
             </a:fld>
             <a:endParaRPr lang="en-US"/>
           </a:p>
@@ -457,7 +463,7 @@
           <a:p>
             <a:fld id="{0ACCDA5F-2533-49E2-AC69-2001D303C7D1}" type="datetimeFigureOut">
               <a:rPr lang="en-US" smtClean="0"/>
-              <a:t>11/24/2017</a:t>
+              <a:t>12/9/2017</a:t>
             </a:fld>
             <a:endParaRPr lang="en-US"/>
           </a:p>
@@ -665,7 +671,7 @@
           <a:p>
             <a:fld id="{0ACCDA5F-2533-49E2-AC69-2001D303C7D1}" type="datetimeFigureOut">
               <a:rPr lang="en-US" smtClean="0"/>
-              <a:t>11/24/2017</a:t>
+              <a:t>12/9/2017</a:t>
             </a:fld>
             <a:endParaRPr lang="en-US"/>
           </a:p>
@@ -863,7 +869,7 @@
           <a:p>
             <a:fld id="{0ACCDA5F-2533-49E2-AC69-2001D303C7D1}" type="datetimeFigureOut">
               <a:rPr lang="en-US" smtClean="0"/>
-              <a:t>11/24/2017</a:t>
+              <a:t>12/9/2017</a:t>
             </a:fld>
             <a:endParaRPr lang="en-US"/>
           </a:p>
@@ -1138,7 +1144,7 @@
           <a:p>
             <a:fld id="{0ACCDA5F-2533-49E2-AC69-2001D303C7D1}" type="datetimeFigureOut">
               <a:rPr lang="en-US" smtClean="0"/>
-              <a:t>11/24/2017</a:t>
+              <a:t>12/9/2017</a:t>
             </a:fld>
             <a:endParaRPr lang="en-US"/>
           </a:p>
@@ -1403,7 +1409,7 @@
           <a:p>
             <a:fld id="{0ACCDA5F-2533-49E2-AC69-2001D303C7D1}" type="datetimeFigureOut">
               <a:rPr lang="en-US" smtClean="0"/>
-              <a:t>11/24/2017</a:t>
+              <a:t>12/9/2017</a:t>
             </a:fld>
             <a:endParaRPr lang="en-US"/>
           </a:p>
@@ -1815,7 +1821,7 @@
           <a:p>
             <a:fld id="{0ACCDA5F-2533-49E2-AC69-2001D303C7D1}" type="datetimeFigureOut">
               <a:rPr lang="en-US" smtClean="0"/>
-              <a:t>11/24/2017</a:t>
+              <a:t>12/9/2017</a:t>
             </a:fld>
             <a:endParaRPr lang="en-US"/>
           </a:p>
@@ -1956,7 +1962,7 @@
           <a:p>
             <a:fld id="{0ACCDA5F-2533-49E2-AC69-2001D303C7D1}" type="datetimeFigureOut">
               <a:rPr lang="en-US" smtClean="0"/>
-              <a:t>11/24/2017</a:t>
+              <a:t>12/9/2017</a:t>
             </a:fld>
             <a:endParaRPr lang="en-US"/>
           </a:p>
@@ -2069,7 +2075,7 @@
           <a:p>
             <a:fld id="{0ACCDA5F-2533-49E2-AC69-2001D303C7D1}" type="datetimeFigureOut">
               <a:rPr lang="en-US" smtClean="0"/>
-              <a:t>11/24/2017</a:t>
+              <a:t>12/9/2017</a:t>
             </a:fld>
             <a:endParaRPr lang="en-US"/>
           </a:p>
@@ -2380,7 +2386,7 @@
           <a:p>
             <a:fld id="{0ACCDA5F-2533-49E2-AC69-2001D303C7D1}" type="datetimeFigureOut">
               <a:rPr lang="en-US" smtClean="0"/>
-              <a:t>11/24/2017</a:t>
+              <a:t>12/9/2017</a:t>
             </a:fld>
             <a:endParaRPr lang="en-US"/>
           </a:p>
@@ -2668,7 +2674,7 @@
           <a:p>
             <a:fld id="{0ACCDA5F-2533-49E2-AC69-2001D303C7D1}" type="datetimeFigureOut">
               <a:rPr lang="en-US" smtClean="0"/>
-              <a:t>11/24/2017</a:t>
+              <a:t>12/9/2017</a:t>
             </a:fld>
             <a:endParaRPr lang="en-US"/>
           </a:p>
@@ -2909,7 +2915,7 @@
           <a:p>
             <a:fld id="{0ACCDA5F-2533-49E2-AC69-2001D303C7D1}" type="datetimeFigureOut">
               <a:rPr lang="en-US" smtClean="0"/>
-              <a:t>11/24/2017</a:t>
+              <a:t>12/9/2017</a:t>
             </a:fld>
             <a:endParaRPr lang="en-US"/>
           </a:p>
@@ -3608,6 +3614,66 @@
     <p:extLst>
       <p:ext uri="{BB962C8B-B14F-4D97-AF65-F5344CB8AC3E}">
         <p14:creationId xmlns:p14="http://schemas.microsoft.com/office/powerpoint/2010/main" val="1095793224"/>
+      </p:ext>
+    </p:extLst>
+  </p:cSld>
+  <p:clrMapOvr>
+    <a:masterClrMapping/>
+  </p:clrMapOvr>
+</p:sld>
+</file>
+
+<file path=ppt/slides/slide3.xml><?xml version="1.0" encoding="utf-8"?>
+<p:sld xmlns:a="http://schemas.openxmlformats.org/drawingml/2006/main" xmlns:r="http://schemas.openxmlformats.org/officeDocument/2006/relationships" xmlns:p="http://schemas.openxmlformats.org/presentationml/2006/main">
+  <p:cSld>
+    <p:spTree>
+      <p:nvGrpSpPr>
+        <p:cNvPr id="1" name=""/>
+        <p:cNvGrpSpPr/>
+        <p:nvPr/>
+      </p:nvGrpSpPr>
+      <p:grpSpPr>
+        <a:xfrm>
+          <a:off x="0" y="0"/>
+          <a:ext cx="0" cy="0"/>
+          <a:chOff x="0" y="0"/>
+          <a:chExt cx="0" cy="0"/>
+        </a:xfrm>
+      </p:grpSpPr>
+      <p:pic>
+        <p:nvPicPr>
+          <p:cNvPr id="2" name="Picture 1">
+            <a:extLst>
+              <a:ext uri="{FF2B5EF4-FFF2-40B4-BE49-F238E27FC236}">
+                <a16:creationId xmlns:a16="http://schemas.microsoft.com/office/drawing/2014/main" id="{8DA3FEA5-5B66-4187-97DF-3E367AE42165}"/>
+              </a:ext>
+            </a:extLst>
+          </p:cNvPr>
+          <p:cNvPicPr>
+            <a:picLocks noChangeAspect="1"/>
+          </p:cNvPicPr>
+          <p:nvPr/>
+        </p:nvPicPr>
+        <p:blipFill>
+          <a:blip r:embed="rId2"/>
+          <a:stretch>
+            <a:fillRect/>
+          </a:stretch>
+        </p:blipFill>
+        <p:spPr>
+          <a:xfrm>
+            <a:off x="2871787" y="166687"/>
+            <a:ext cx="6448425" cy="6524625"/>
+          </a:xfrm>
+          <a:prstGeom prst="rect">
+            <a:avLst/>
+          </a:prstGeom>
+        </p:spPr>
+      </p:pic>
+    </p:spTree>
+    <p:extLst>
+      <p:ext uri="{BB962C8B-B14F-4D97-AF65-F5344CB8AC3E}">
+        <p14:creationId xmlns:p14="http://schemas.microsoft.com/office/powerpoint/2010/main" val="2549656722"/>
       </p:ext>
     </p:extLst>
   </p:cSld>

</xml_diff>